<commit_message>
Added figures based on surface area normalization, new script to do SA caclulations quickly, and finished the MITEI presentation.
</commit_message>
<xml_diff>
--- a/Presentations/MITEISeedFundMeeting-2017 D-2.pptx
+++ b/Presentations/MITEISeedFundMeeting-2017 D-2.pptx
@@ -344,11 +344,11 @@
         </c:dLbls>
         <c:gapWidth val="150"/>
         <c:overlap val="100"/>
-        <c:axId val="286347824"/>
-        <c:axId val="286348608"/>
+        <c:axId val="241119784"/>
+        <c:axId val="241115472"/>
       </c:barChart>
       <c:catAx>
-        <c:axId val="286347824"/>
+        <c:axId val="241119784"/>
         <c:scaling>
           <c:orientation val="minMax"/>
         </c:scaling>
@@ -385,7 +385,7 @@
             <a:endParaRPr lang="en-US"/>
           </a:p>
         </c:txPr>
-        <c:crossAx val="286348608"/>
+        <c:crossAx val="241115472"/>
         <c:crosses val="autoZero"/>
         <c:auto val="1"/>
         <c:lblAlgn val="ctr"/>
@@ -393,7 +393,7 @@
         <c:noMultiLvlLbl val="0"/>
       </c:catAx>
       <c:valAx>
-        <c:axId val="286348608"/>
+        <c:axId val="241115472"/>
         <c:scaling>
           <c:orientation val="minMax"/>
         </c:scaling>
@@ -483,7 +483,7 @@
             <a:endParaRPr lang="en-US"/>
           </a:p>
         </c:txPr>
-        <c:crossAx val="286347824"/>
+        <c:crossAx val="241119784"/>
         <c:crosses val="autoZero"/>
         <c:crossBetween val="between"/>
       </c:valAx>
@@ -962,11 +962,11 @@
           <c:showPercent val="0"/>
           <c:showBubbleSize val="0"/>
         </c:dLbls>
-        <c:axId val="286350176"/>
-        <c:axId val="286350568"/>
+        <c:axId val="241119000"/>
+        <c:axId val="241115080"/>
       </c:scatterChart>
       <c:valAx>
-        <c:axId val="286350176"/>
+        <c:axId val="241119000"/>
         <c:scaling>
           <c:orientation val="minMax"/>
         </c:scaling>
@@ -1053,12 +1053,12 @@
             <a:endParaRPr lang="en-US"/>
           </a:p>
         </c:txPr>
-        <c:crossAx val="286350568"/>
+        <c:crossAx val="241115080"/>
         <c:crosses val="autoZero"/>
         <c:crossBetween val="midCat"/>
       </c:valAx>
       <c:valAx>
-        <c:axId val="286350568"/>
+        <c:axId val="241115080"/>
         <c:scaling>
           <c:orientation val="minMax"/>
         </c:scaling>
@@ -1146,7 +1146,7 @@
             <a:endParaRPr lang="en-US"/>
           </a:p>
         </c:txPr>
-        <c:crossAx val="286350176"/>
+        <c:crossAx val="241119000"/>
         <c:crosses val="autoZero"/>
         <c:crossBetween val="midCat"/>
       </c:valAx>
@@ -1637,11 +1637,11 @@
           <c:showPercent val="0"/>
           <c:showBubbleSize val="0"/>
         </c:dLbls>
-        <c:axId val="286347432"/>
-        <c:axId val="286349784"/>
+        <c:axId val="241120176"/>
+        <c:axId val="241121352"/>
       </c:scatterChart>
       <c:valAx>
-        <c:axId val="286347432"/>
+        <c:axId val="241120176"/>
         <c:scaling>
           <c:orientation val="minMax"/>
         </c:scaling>
@@ -1728,12 +1728,12 @@
             <a:endParaRPr lang="en-US"/>
           </a:p>
         </c:txPr>
-        <c:crossAx val="286349784"/>
+        <c:crossAx val="241121352"/>
         <c:crosses val="autoZero"/>
         <c:crossBetween val="midCat"/>
       </c:valAx>
       <c:valAx>
-        <c:axId val="286349784"/>
+        <c:axId val="241121352"/>
         <c:scaling>
           <c:orientation val="minMax"/>
         </c:scaling>
@@ -1821,7 +1821,7 @@
             <a:endParaRPr lang="en-US"/>
           </a:p>
         </c:txPr>
-        <c:crossAx val="286347432"/>
+        <c:crossAx val="241120176"/>
         <c:crosses val="autoZero"/>
         <c:crossBetween val="midCat"/>
       </c:valAx>
@@ -3709,7 +3709,7 @@
           <a:p>
             <a:fld id="{849E538C-A645-4A61-8061-296E55B8BFF2}" type="datetimeFigureOut">
               <a:rPr lang="en-US" smtClean="0"/>
-              <a:t>2/28/2017</a:t>
+              <a:t>3/1/2017</a:t>
             </a:fld>
             <a:endParaRPr lang="en-US"/>
           </a:p>
@@ -3879,7 +3879,7 @@
           <a:p>
             <a:fld id="{849E538C-A645-4A61-8061-296E55B8BFF2}" type="datetimeFigureOut">
               <a:rPr lang="en-US" smtClean="0"/>
-              <a:t>2/28/2017</a:t>
+              <a:t>3/1/2017</a:t>
             </a:fld>
             <a:endParaRPr lang="en-US"/>
           </a:p>
@@ -4059,7 +4059,7 @@
           <a:p>
             <a:fld id="{849E538C-A645-4A61-8061-296E55B8BFF2}" type="datetimeFigureOut">
               <a:rPr lang="en-US" smtClean="0"/>
-              <a:t>2/28/2017</a:t>
+              <a:t>3/1/2017</a:t>
             </a:fld>
             <a:endParaRPr lang="en-US"/>
           </a:p>
@@ -4229,7 +4229,7 @@
           <a:p>
             <a:fld id="{849E538C-A645-4A61-8061-296E55B8BFF2}" type="datetimeFigureOut">
               <a:rPr lang="en-US" smtClean="0"/>
-              <a:t>2/28/2017</a:t>
+              <a:t>3/1/2017</a:t>
             </a:fld>
             <a:endParaRPr lang="en-US"/>
           </a:p>
@@ -4473,7 +4473,7 @@
           <a:p>
             <a:fld id="{849E538C-A645-4A61-8061-296E55B8BFF2}" type="datetimeFigureOut">
               <a:rPr lang="en-US" smtClean="0"/>
-              <a:t>2/28/2017</a:t>
+              <a:t>3/1/2017</a:t>
             </a:fld>
             <a:endParaRPr lang="en-US"/>
           </a:p>
@@ -4705,7 +4705,7 @@
           <a:p>
             <a:fld id="{849E538C-A645-4A61-8061-296E55B8BFF2}" type="datetimeFigureOut">
               <a:rPr lang="en-US" smtClean="0"/>
-              <a:t>2/28/2017</a:t>
+              <a:t>3/1/2017</a:t>
             </a:fld>
             <a:endParaRPr lang="en-US"/>
           </a:p>
@@ -5072,7 +5072,7 @@
           <a:p>
             <a:fld id="{849E538C-A645-4A61-8061-296E55B8BFF2}" type="datetimeFigureOut">
               <a:rPr lang="en-US" smtClean="0"/>
-              <a:t>2/28/2017</a:t>
+              <a:t>3/1/2017</a:t>
             </a:fld>
             <a:endParaRPr lang="en-US"/>
           </a:p>
@@ -5190,7 +5190,7 @@
           <a:p>
             <a:fld id="{849E538C-A645-4A61-8061-296E55B8BFF2}" type="datetimeFigureOut">
               <a:rPr lang="en-US" smtClean="0"/>
-              <a:t>2/28/2017</a:t>
+              <a:t>3/1/2017</a:t>
             </a:fld>
             <a:endParaRPr lang="en-US"/>
           </a:p>
@@ -5285,7 +5285,7 @@
           <a:p>
             <a:fld id="{849E538C-A645-4A61-8061-296E55B8BFF2}" type="datetimeFigureOut">
               <a:rPr lang="en-US" smtClean="0"/>
-              <a:t>2/28/2017</a:t>
+              <a:t>3/1/2017</a:t>
             </a:fld>
             <a:endParaRPr lang="en-US"/>
           </a:p>
@@ -5562,7 +5562,7 @@
           <a:p>
             <a:fld id="{849E538C-A645-4A61-8061-296E55B8BFF2}" type="datetimeFigureOut">
               <a:rPr lang="en-US" smtClean="0"/>
-              <a:t>2/28/2017</a:t>
+              <a:t>3/1/2017</a:t>
             </a:fld>
             <a:endParaRPr lang="en-US"/>
           </a:p>
@@ -5819,7 +5819,7 @@
           <a:p>
             <a:fld id="{849E538C-A645-4A61-8061-296E55B8BFF2}" type="datetimeFigureOut">
               <a:rPr lang="en-US" smtClean="0"/>
-              <a:t>2/28/2017</a:t>
+              <a:t>3/1/2017</a:t>
             </a:fld>
             <a:endParaRPr lang="en-US"/>
           </a:p>
@@ -6032,7 +6032,7 @@
           <a:p>
             <a:fld id="{849E538C-A645-4A61-8061-296E55B8BFF2}" type="datetimeFigureOut">
               <a:rPr lang="en-US" smtClean="0"/>
-              <a:t>2/28/2017</a:t>
+              <a:t>3/1/2017</a:t>
             </a:fld>
             <a:endParaRPr lang="en-US"/>
           </a:p>
@@ -7829,21 +7829,14 @@
                 <a:latin typeface="Times New Roman" panose="02020603050405020304" pitchFamily="18" charset="0"/>
                 <a:cs typeface="Times New Roman" panose="02020603050405020304" pitchFamily="18" charset="0"/>
               </a:rPr>
-              <a:t>Ra: </a:t>
-            </a:r>
-            <a:r>
-              <a:rPr lang="en-US" sz="3600" dirty="0" smtClean="0">
-                <a:latin typeface="Times New Roman" panose="02020603050405020304" pitchFamily="18" charset="0"/>
-                <a:cs typeface="Times New Roman" panose="02020603050405020304" pitchFamily="18" charset="0"/>
-              </a:rPr>
-              <a:t>135-7300 </a:t>
+              <a:t>Ra: 135-7300 </a:t>
             </a:r>
             <a:r>
               <a:rPr lang="en-US" sz="3600" dirty="0" err="1" smtClean="0">
                 <a:latin typeface="Times New Roman" panose="02020603050405020304" pitchFamily="18" charset="0"/>
                 <a:cs typeface="Times New Roman" panose="02020603050405020304" pitchFamily="18" charset="0"/>
               </a:rPr>
-              <a:t>Bq</a:t>
+              <a:t>pCi</a:t>
             </a:r>
             <a:endParaRPr lang="en-US" sz="3600" dirty="0" smtClean="0">
               <a:latin typeface="Times New Roman" panose="02020603050405020304" pitchFamily="18" charset="0"/>
@@ -11463,8 +11456,8 @@
           </p:sp>
         </mc:Fallback>
       </mc:AlternateContent>
-      <mc:AlternateContent xmlns:mc="http://schemas.openxmlformats.org/markup-compatibility/2006" xmlns:a14="http://schemas.microsoft.com/office/drawing/2010/main">
-        <mc:Choice Requires="a14">
+      <mc:AlternateContent xmlns:mc="http://schemas.openxmlformats.org/markup-compatibility/2006">
+        <mc:Choice xmlns:a14="http://schemas.microsoft.com/office/drawing/2010/main" Requires="a14">
           <p:sp>
             <p:nvSpPr>
               <p:cNvPr id="110" name="Rectangle 109"/>
@@ -11545,7 +11538,17 @@
                     <a:latin typeface="Times New Roman" panose="02020603050405020304" pitchFamily="18" charset="0"/>
                     <a:cs typeface="Times New Roman" panose="02020603050405020304" pitchFamily="18" charset="0"/>
                   </a:rPr>
-                  <a:t>= 0.25atoms/L/sec/m</a:t>
+                  <a:t>= </a:t>
+                </a:r>
+                <a:r>
+                  <a:rPr lang="en-US" sz="2800" dirty="0" smtClean="0">
+                    <a:solidFill>
+                      <a:srgbClr val="000000"/>
+                    </a:solidFill>
+                    <a:latin typeface="Times New Roman" panose="02020603050405020304" pitchFamily="18" charset="0"/>
+                    <a:cs typeface="Times New Roman" panose="02020603050405020304" pitchFamily="18" charset="0"/>
+                  </a:rPr>
+                  <a:t>0.25 atoms/L/sec/m</a:t>
                 </a:r>
                 <a:r>
                   <a:rPr lang="en-US" sz="2800" baseline="30000" dirty="0" smtClean="0">
@@ -11557,11 +11560,18 @@
                   </a:rPr>
                   <a:t>2</a:t>
                 </a:r>
+                <a:endParaRPr lang="en-US" sz="2800" baseline="30000" dirty="0" smtClean="0">
+                  <a:solidFill>
+                    <a:srgbClr val="000000"/>
+                  </a:solidFill>
+                  <a:latin typeface="Times New Roman" panose="02020603050405020304" pitchFamily="18" charset="0"/>
+                  <a:cs typeface="Times New Roman" panose="02020603050405020304" pitchFamily="18" charset="0"/>
+                </a:endParaRPr>
               </a:p>
             </p:txBody>
           </p:sp>
         </mc:Choice>
-        <mc:Fallback xmlns="">
+        <mc:Fallback>
           <p:sp>
             <p:nvSpPr>
               <p:cNvPr id="110" name="Rectangle 109"/>
@@ -11581,7 +11591,7 @@
               <a:blipFill rotWithShape="0">
                 <a:blip r:embed="rId38"/>
                 <a:stretch>
-                  <a:fillRect l="-3130" t="-6369" b="-16561"/>
+                  <a:fillRect l="-3130" t="-6369" r="-447" b="-16561"/>
                 </a:stretch>
               </a:blipFill>
               <a:ln w="12700">

</xml_diff>